<commit_message>
added moritz' bullet points
</commit_message>
<xml_diff>
--- a/docs/milestone presentations/1-presentation/1-complete.pptx
+++ b/docs/milestone presentations/1-presentation/1-complete.pptx
@@ -5,7 +5,7 @@
     <p:sldMasterId id="2147483648" r:id="rId1"/>
   </p:sldMasterIdLst>
   <p:notesMasterIdLst>
-    <p:notesMasterId r:id="rId9"/>
+    <p:notesMasterId r:id="rId8"/>
   </p:notesMasterIdLst>
   <p:sldIdLst>
     <p:sldId id="256" r:id="rId2"/>
@@ -13,13 +13,12 @@
     <p:sldId id="260" r:id="rId4"/>
     <p:sldId id="261" r:id="rId5"/>
     <p:sldId id="258" r:id="rId6"/>
-    <p:sldId id="262" r:id="rId7"/>
-    <p:sldId id="259" r:id="rId8"/>
+    <p:sldId id="259" r:id="rId7"/>
   </p:sldIdLst>
   <p:sldSz cx="9144000" cy="6858000" type="screen4x3"/>
   <p:notesSz cx="6858000" cy="9144000"/>
   <p:custDataLst>
-    <p:tags r:id="rId10"/>
+    <p:tags r:id="rId9"/>
   </p:custDataLst>
   <p:defaultTextStyle>
     <a:defPPr>
@@ -3949,37 +3948,7 @@
                   <a:schemeClr val="tx1"/>
                 </a:solidFill>
               </a:rPr>
-              <a:t>Projektz</a:t>
-            </a:r>
-            <a:r>
-              <a:rPr lang="fr-FR" dirty="0" err="1" smtClean="0">
-                <a:solidFill>
-                  <a:schemeClr val="tx1"/>
-                </a:solidFill>
-              </a:rPr>
-              <a:t>iele</a:t>
-            </a:r>
-            <a:endParaRPr lang="fr-FR" dirty="0" smtClean="0">
-              <a:solidFill>
-                <a:schemeClr val="tx1"/>
-              </a:solidFill>
-            </a:endParaRPr>
-          </a:p>
-          <a:p>
-            <a:pPr>
-              <a:lnSpc>
-                <a:spcPct val="200000"/>
-              </a:lnSpc>
-              <a:buFont typeface="+mj-lt"/>
-              <a:buAutoNum type="arabicPeriod"/>
-            </a:pPr>
-            <a:r>
-              <a:rPr lang="fr-FR" dirty="0" err="1" smtClean="0">
-                <a:solidFill>
-                  <a:schemeClr val="tx1"/>
-                </a:solidFill>
-              </a:rPr>
-              <a:t>Probleme</a:t>
+              <a:t>Projektziele</a:t>
             </a:r>
             <a:endParaRPr lang="fr-FR" dirty="0" smtClean="0">
               <a:solidFill>
@@ -4250,7 +4219,7 @@
     </p:spTree>
     <p:extLst>
       <p:ext uri="{BB962C8B-B14F-4D97-AF65-F5344CB8AC3E}">
-        <p14:creationId xmlns:p14="http://schemas.microsoft.com/office/powerpoint/2010/main" xmlns="" val="114017146"/>
+        <p14:creationId xmlns="" xmlns:p14="http://schemas.microsoft.com/office/powerpoint/2010/main" val="114017146"/>
       </p:ext>
     </p:extLst>
   </p:cSld>
@@ -4324,7 +4293,7 @@
               <a:buFontTx/>
               <a:buChar char="-"/>
             </a:pPr>
-            <a:endParaRPr lang="de-DE" sz="2400" smtClean="0"/>
+            <a:endParaRPr lang="de-DE" dirty="0" smtClean="0"/>
           </a:p>
           <a:p>
             <a:pPr>
@@ -4332,8 +4301,20 @@
               <a:buChar char="-"/>
             </a:pPr>
             <a:r>
-              <a:rPr lang="de-DE" sz="2400" smtClean="0"/>
-              <a:t>Implementierung des Datentypes „mathematische Formel“</a:t>
+              <a:rPr lang="de-DE" dirty="0" smtClean="0"/>
+              <a:t>Implementierung des </a:t>
+            </a:r>
+            <a:r>
+              <a:rPr lang="de-DE" dirty="0" err="1" smtClean="0"/>
+              <a:t>Datentypes</a:t>
+            </a:r>
+            <a:r>
+              <a:rPr lang="de-DE" dirty="0" smtClean="0"/>
+              <a:t> „mathematische Formel</a:t>
+            </a:r>
+            <a:r>
+              <a:rPr lang="de-DE" dirty="0" smtClean="0"/>
+              <a:t>“</a:t>
             </a:r>
           </a:p>
           <a:p>
@@ -4342,9 +4323,18 @@
               <a:buChar char="-"/>
             </a:pPr>
             <a:r>
-              <a:rPr lang="de-DE" sz="2400" smtClean="0"/>
-              <a:t>Darstellung</a:t>
-            </a:r>
+              <a:rPr lang="de-DE" dirty="0" smtClean="0">
+                <a:solidFill>
+                  <a:srgbClr val="FF0000"/>
+                </a:solidFill>
+              </a:rPr>
+              <a:t>Definieren</a:t>
+            </a:r>
+            <a:endParaRPr lang="de-DE" dirty="0" smtClean="0">
+              <a:solidFill>
+                <a:srgbClr val="FF0000"/>
+              </a:solidFill>
+            </a:endParaRPr>
           </a:p>
           <a:p>
             <a:pPr lvl="1">
@@ -4352,25 +4342,8 @@
               <a:buChar char="-"/>
             </a:pPr>
             <a:r>
-              <a:rPr lang="de-DE" sz="2400" smtClean="0"/>
-              <a:t>(Berechnung)</a:t>
-            </a:r>
-          </a:p>
-          <a:p>
-            <a:pPr>
-              <a:buFontTx/>
-              <a:buChar char="-"/>
-            </a:pPr>
-            <a:endParaRPr lang="de-DE" sz="2400" smtClean="0"/>
-          </a:p>
-          <a:p>
-            <a:pPr>
-              <a:buFontTx/>
-              <a:buChar char="-"/>
-            </a:pPr>
-            <a:r>
-              <a:rPr lang="de-DE" sz="2400" smtClean="0"/>
-              <a:t>Automatisches Erkennen von mathematischen Formeln in Wikipedia</a:t>
+              <a:rPr lang="de-DE" dirty="0" smtClean="0"/>
+              <a:t>Darstellung</a:t>
             </a:r>
           </a:p>
           <a:p>
@@ -4379,16 +4352,67 @@
               <a:buChar char="-"/>
             </a:pPr>
             <a:r>
-              <a:rPr lang="de-DE" sz="2400" smtClean="0"/>
-              <a:t>Fokus auf einfache, benannte Formeln</a:t>
-            </a:r>
+              <a:rPr lang="de-DE" dirty="0" smtClean="0">
+                <a:solidFill>
+                  <a:srgbClr val="FF0000"/>
+                </a:solidFill>
+              </a:rPr>
+              <a:t>Evaluieren (= Punkt unten [</a:t>
+            </a:r>
+            <a:r>
+              <a:rPr lang="de-DE" dirty="0" err="1" smtClean="0">
+                <a:solidFill>
+                  <a:srgbClr val="FF0000"/>
+                </a:solidFill>
+              </a:rPr>
+              <a:t>autom</a:t>
+            </a:r>
+            <a:r>
+              <a:rPr lang="de-DE" dirty="0" smtClean="0">
+                <a:solidFill>
+                  <a:srgbClr val="FF0000"/>
+                </a:solidFill>
+              </a:rPr>
+              <a:t>. Erkennen…])</a:t>
+            </a:r>
+            <a:endParaRPr lang="de-DE" dirty="0" smtClean="0">
+              <a:solidFill>
+                <a:srgbClr val="FF0000"/>
+              </a:solidFill>
+            </a:endParaRPr>
           </a:p>
           <a:p>
             <a:pPr lvl="1">
               <a:buFontTx/>
               <a:buChar char="-"/>
             </a:pPr>
-            <a:endParaRPr lang="de-DE" smtClean="0"/>
+            <a:r>
+              <a:rPr lang="de-DE" dirty="0" smtClean="0"/>
+              <a:t>(Berechnung</a:t>
+            </a:r>
+            <a:r>
+              <a:rPr lang="de-DE" dirty="0" smtClean="0"/>
+              <a:t>)</a:t>
+            </a:r>
+          </a:p>
+          <a:p>
+            <a:pPr lvl="1">
+              <a:buFontTx/>
+              <a:buChar char="-"/>
+            </a:pPr>
+            <a:r>
+              <a:rPr lang="de-DE" dirty="0" smtClean="0">
+                <a:solidFill>
+                  <a:srgbClr val="FF0000"/>
+                </a:solidFill>
+              </a:rPr>
+              <a:t>Soll in Praxis verwendbar sein</a:t>
+            </a:r>
+            <a:endParaRPr lang="de-DE" dirty="0" smtClean="0">
+              <a:solidFill>
+                <a:srgbClr val="FF0000"/>
+              </a:solidFill>
+            </a:endParaRPr>
           </a:p>
           <a:p>
             <a:pPr>
@@ -4397,6 +4421,82 @@
             </a:pPr>
             <a:endParaRPr lang="de-DE" dirty="0" smtClean="0"/>
           </a:p>
+          <a:p>
+            <a:pPr>
+              <a:buFontTx/>
+              <a:buChar char="-"/>
+            </a:pPr>
+            <a:r>
+              <a:rPr lang="de-DE" dirty="0" smtClean="0"/>
+              <a:t>Automatisches Erkennen von mathematischen Formeln in </a:t>
+            </a:r>
+            <a:r>
+              <a:rPr lang="de-DE" dirty="0" err="1" smtClean="0"/>
+              <a:t>Wikipedia</a:t>
+            </a:r>
+            <a:endParaRPr lang="de-DE" dirty="0" smtClean="0"/>
+          </a:p>
+          <a:p>
+            <a:pPr lvl="1">
+              <a:buFontTx/>
+              <a:buChar char="-"/>
+            </a:pPr>
+            <a:r>
+              <a:rPr lang="de-DE" dirty="0" smtClean="0"/>
+              <a:t>Fokus auf einfache, benannte </a:t>
+            </a:r>
+            <a:r>
+              <a:rPr lang="de-DE" dirty="0" smtClean="0"/>
+              <a:t>Formeln</a:t>
+            </a:r>
+          </a:p>
+          <a:p>
+            <a:pPr lvl="1">
+              <a:buFontTx/>
+              <a:buChar char="-"/>
+            </a:pPr>
+            <a:r>
+              <a:rPr lang="de-DE" dirty="0" err="1" smtClean="0"/>
+              <a:t>Händisch</a:t>
+            </a:r>
+            <a:r>
+              <a:rPr lang="de-DE" dirty="0" smtClean="0"/>
+              <a:t> / Formular </a:t>
+            </a:r>
+          </a:p>
+          <a:p>
+            <a:pPr lvl="1">
+              <a:buFontTx/>
+              <a:buChar char="-"/>
+            </a:pPr>
+            <a:r>
+              <a:rPr lang="de-DE" dirty="0" smtClean="0">
+                <a:solidFill>
+                  <a:srgbClr val="FF0000"/>
+                </a:solidFill>
+              </a:rPr>
+              <a:t>-&gt; Ist Evaluierung / Ausführung, aber nicht wirklich Ziel des Projekts (nur Ansatz für Datenquelle)</a:t>
+            </a:r>
+            <a:endParaRPr lang="de-DE" dirty="0" smtClean="0">
+              <a:solidFill>
+                <a:srgbClr val="FF0000"/>
+              </a:solidFill>
+            </a:endParaRPr>
+          </a:p>
+          <a:p>
+            <a:pPr lvl="1">
+              <a:buFontTx/>
+              <a:buChar char="-"/>
+            </a:pPr>
+            <a:endParaRPr lang="de-DE" dirty="0" smtClean="0"/>
+          </a:p>
+          <a:p>
+            <a:pPr>
+              <a:buFontTx/>
+              <a:buChar char="-"/>
+            </a:pPr>
+            <a:endParaRPr lang="de-DE" dirty="0" smtClean="0"/>
+          </a:p>
         </p:txBody>
       </p:sp>
       <p:sp>
@@ -4467,7 +4567,7 @@
     </p:spTree>
     <p:extLst>
       <p:ext uri="{BB962C8B-B14F-4D97-AF65-F5344CB8AC3E}">
-        <p14:creationId xmlns:p14="http://schemas.microsoft.com/office/powerpoint/2010/main" xmlns="" val="613567455"/>
+        <p14:creationId xmlns="" xmlns:p14="http://schemas.microsoft.com/office/powerpoint/2010/main" val="613567455"/>
       </p:ext>
     </p:extLst>
   </p:cSld>
@@ -4515,8 +4615,8 @@
           <a:lstStyle/>
           <a:p>
             <a:r>
-              <a:rPr lang="de-DE" dirty="0" smtClean="0"/>
-              <a:t>Probleme</a:t>
+              <a:rPr lang="de-DE" dirty="0" err="1" smtClean="0"/>
+              <a:t>Roadmap</a:t>
             </a:r>
             <a:endParaRPr lang="de-DE" dirty="0"/>
           </a:p>
@@ -4599,6 +4699,44 @@
                 </a:solidFill>
               </a:rPr>
               <a:t>Formeln</a:t>
+            </a:r>
+            <a:endParaRPr lang="fr-FR" dirty="0" smtClean="0">
+              <a:solidFill>
+                <a:schemeClr val="tx1"/>
+              </a:solidFill>
+            </a:endParaRPr>
+          </a:p>
+          <a:p>
+            <a:pPr>
+              <a:lnSpc>
+                <a:spcPct val="150000"/>
+              </a:lnSpc>
+              <a:buFont typeface="Arial" pitchFamily="34" charset="0"/>
+              <a:buChar char="•"/>
+            </a:pPr>
+            <a:r>
+              <a:rPr lang="de-DE" dirty="0" smtClean="0"/>
+              <a:t>Abstimmung der Aufgaben mit </a:t>
+            </a:r>
+            <a:r>
+              <a:rPr lang="de-DE" dirty="0" err="1" smtClean="0"/>
+              <a:t>Wikidata</a:t>
+            </a:r>
+            <a:r>
+              <a:rPr lang="de-DE" dirty="0" smtClean="0"/>
+              <a:t> (</a:t>
+            </a:r>
+            <a:r>
+              <a:rPr lang="de-DE" dirty="0" err="1" smtClean="0"/>
+              <a:t>Wikipedia</a:t>
+            </a:r>
+            <a:r>
+              <a:rPr lang="de-DE" dirty="0" smtClean="0"/>
+              <a:t> DE Zentrale Berlin</a:t>
+            </a:r>
+            <a:r>
+              <a:rPr lang="de-DE" dirty="0" smtClean="0"/>
+              <a:t>)</a:t>
             </a:r>
             <a:endParaRPr lang="fr-FR" dirty="0" smtClean="0">
               <a:solidFill>
@@ -5111,141 +5249,6 @@
           <a:lstStyle/>
           <a:p>
             <a:r>
-              <a:rPr lang="de-DE" dirty="0" err="1" smtClean="0"/>
-              <a:t>Roadmap</a:t>
-            </a:r>
-            <a:endParaRPr lang="de-DE" dirty="0"/>
-          </a:p>
-        </p:txBody>
-      </p:sp>
-      <p:sp>
-        <p:nvSpPr>
-          <p:cNvPr id="3" name="Inhaltsplatzhalter 2"/>
-          <p:cNvSpPr>
-            <a:spLocks noGrp="1"/>
-          </p:cNvSpPr>
-          <p:nvPr>
-            <p:ph idx="1"/>
-          </p:nvPr>
-        </p:nvSpPr>
-        <p:spPr/>
-        <p:txBody>
-          <a:bodyPr/>
-          <a:lstStyle/>
-          <a:p>
-            <a:endParaRPr lang="de-DE" dirty="0"/>
-          </a:p>
-        </p:txBody>
-      </p:sp>
-      <p:sp>
-        <p:nvSpPr>
-          <p:cNvPr id="4" name="Fußzeilenplatzhalter 3"/>
-          <p:cNvSpPr>
-            <a:spLocks noGrp="1"/>
-          </p:cNvSpPr>
-          <p:nvPr>
-            <p:ph type="ftr" sz="quarter" idx="10"/>
-          </p:nvPr>
-        </p:nvSpPr>
-        <p:spPr/>
-        <p:txBody>
-          <a:bodyPr/>
-          <a:lstStyle/>
-          <a:p>
-            <a:r>
-              <a:rPr lang="de-DE" smtClean="0"/>
-              <a:t>Präsentationstitel Blindtext Lorem ipsum dolores </a:t>
-            </a:r>
-            <a:r>
-              <a:rPr lang="de-DE" b="0" smtClean="0"/>
-              <a:t>|</a:t>
-            </a:r>
-            <a:r>
-              <a:rPr lang="de-DE" smtClean="0"/>
-              <a:t> </a:t>
-            </a:r>
-            <a:r>
-              <a:rPr lang="de-DE" b="0" smtClean="0"/>
-              <a:t>M. Mustermann | Anlass der Präsentation</a:t>
-            </a:r>
-            <a:endParaRPr lang="de-DE" b="0"/>
-          </a:p>
-        </p:txBody>
-      </p:sp>
-      <p:sp>
-        <p:nvSpPr>
-          <p:cNvPr id="5" name="Foliennummernplatzhalter 4"/>
-          <p:cNvSpPr>
-            <a:spLocks noGrp="1"/>
-          </p:cNvSpPr>
-          <p:nvPr>
-            <p:ph type="sldNum" sz="quarter" idx="11"/>
-          </p:nvPr>
-        </p:nvSpPr>
-        <p:spPr/>
-        <p:txBody>
-          <a:bodyPr/>
-          <a:lstStyle/>
-          <a:p>
-            <a:r>
-              <a:rPr lang="de-DE" smtClean="0"/>
-              <a:t>Seite </a:t>
-            </a:r>
-            <a:fld id="{7737BF7B-4974-4536-9485-B1CA4D50CDC2}" type="slidenum">
-              <a:rPr lang="de-DE" smtClean="0"/>
-              <a:pPr/>
-              <a:t>6</a:t>
-            </a:fld>
-            <a:endParaRPr lang="de-DE"/>
-          </a:p>
-        </p:txBody>
-      </p:sp>
-    </p:spTree>
-  </p:cSld>
-  <p:clrMapOvr>
-    <a:masterClrMapping/>
-  </p:clrMapOvr>
-</p:sld>
-</file>
-
-<file path=ppt/slides/slide7.xml><?xml version="1.0" encoding="utf-8"?>
-<p:sld xmlns:a="http://schemas.openxmlformats.org/drawingml/2006/main" xmlns:r="http://schemas.openxmlformats.org/officeDocument/2006/relationships" xmlns:p="http://schemas.openxmlformats.org/presentationml/2006/main">
-  <p:cSld>
-    <p:spTree>
-      <p:nvGrpSpPr>
-        <p:cNvPr id="1" name=""/>
-        <p:cNvGrpSpPr/>
-        <p:nvPr/>
-      </p:nvGrpSpPr>
-      <p:grpSpPr>
-        <a:xfrm>
-          <a:off x="0" y="0"/>
-          <a:ext cx="0" cy="0"/>
-          <a:chOff x="0" y="0"/>
-          <a:chExt cx="0" cy="0"/>
-        </a:xfrm>
-      </p:grpSpPr>
-      <p:sp>
-        <p:nvSpPr>
-          <p:cNvPr id="2" name="Titel 1"/>
-          <p:cNvSpPr>
-            <a:spLocks noGrp="1"/>
-          </p:cNvSpPr>
-          <p:nvPr>
-            <p:ph type="title"/>
-          </p:nvPr>
-        </p:nvSpPr>
-        <p:spPr>
-          <a:xfrm>
-            <a:off x="539750" y="1740115"/>
-            <a:ext cx="8061325" cy="358560"/>
-          </a:xfrm>
-        </p:spPr>
-        <p:txBody>
-          <a:bodyPr/>
-          <a:lstStyle/>
-          <a:p>
-            <a:r>
               <a:rPr lang="de-DE" dirty="0" smtClean="0"/>
               <a:t>Was wir erreicht haben bisher</a:t>
             </a:r>
@@ -5333,8 +5336,8 @@
               <a:t> und </a:t>
             </a:r>
             <a:r>
-              <a:rPr lang="de-DE" dirty="0" err="1" smtClean="0"/>
-              <a:t>properties</a:t>
+              <a:rPr lang="de-DE" dirty="0" smtClean="0"/>
+              <a:t>Eigenschaften</a:t>
             </a:r>
             <a:endParaRPr lang="de-DE" dirty="0" smtClean="0"/>
           </a:p>
@@ -5395,7 +5398,7 @@
             <a:fld id="{7737BF7B-4974-4536-9485-B1CA4D50CDC2}" type="slidenum">
               <a:rPr lang="de-DE" smtClean="0"/>
               <a:pPr/>
-              <a:t>7</a:t>
+              <a:t>6</a:t>
             </a:fld>
             <a:endParaRPr lang="de-DE"/>
           </a:p>

</xml_diff>